<commit_message>
Added slides for machine learning
</commit_message>
<xml_diff>
--- a/Project 4.pptx
+++ b/Project 4.pptx
@@ -5,10 +5,10 @@
     <p:sldMasterId id="2147483648" r:id="rId4"/>
   </p:sldMasterIdLst>
   <p:notesMasterIdLst>
-    <p:notesMasterId r:id="rId16"/>
+    <p:notesMasterId r:id="rId20"/>
   </p:notesMasterIdLst>
   <p:handoutMasterIdLst>
-    <p:handoutMasterId r:id="rId17"/>
+    <p:handoutMasterId r:id="rId21"/>
   </p:handoutMasterIdLst>
   <p:sldIdLst>
     <p:sldId id="256" r:id="rId5"/>
@@ -22,6 +22,10 @@
     <p:sldId id="283" r:id="rId13"/>
     <p:sldId id="284" r:id="rId14"/>
     <p:sldId id="285" r:id="rId15"/>
+    <p:sldId id="286" r:id="rId16"/>
+    <p:sldId id="287" r:id="rId17"/>
+    <p:sldId id="288" r:id="rId18"/>
+    <p:sldId id="289" r:id="rId19"/>
   </p:sldIdLst>
   <p:sldSz cx="12192000" cy="6858000"/>
   <p:notesSz cx="6858000" cy="9144000"/>
@@ -21066,6 +21070,1233 @@
 </p:sld>
 </file>
 
+<file path=ppt/slides/slide12.xml><?xml version="1.0" encoding="utf-8"?>
+<p:sld xmlns:a="http://schemas.openxmlformats.org/drawingml/2006/main" xmlns:r="http://schemas.openxmlformats.org/officeDocument/2006/relationships" xmlns:p="http://schemas.openxmlformats.org/presentationml/2006/main">
+  <p:cSld>
+    <p:spTree>
+      <p:nvGrpSpPr>
+        <p:cNvPr id="1" name=""/>
+        <p:cNvGrpSpPr/>
+        <p:nvPr/>
+      </p:nvGrpSpPr>
+      <p:grpSpPr>
+        <a:xfrm>
+          <a:off x="0" y="0"/>
+          <a:ext cx="0" cy="0"/>
+          <a:chOff x="0" y="0"/>
+          <a:chExt cx="0" cy="0"/>
+        </a:xfrm>
+      </p:grpSpPr>
+      <p:sp>
+        <p:nvSpPr>
+          <p:cNvPr id="16" name="Picture Placeholder 15">
+            <a:extLst>
+              <a:ext uri="{FF2B5EF4-FFF2-40B4-BE49-F238E27FC236}">
+                <a16:creationId xmlns:a16="http://schemas.microsoft.com/office/drawing/2014/main" id="{8C340345-3B6D-E3E5-5080-4067954D3942}"/>
+              </a:ext>
+            </a:extLst>
+          </p:cNvPr>
+          <p:cNvSpPr>
+            <a:spLocks noGrp="1"/>
+          </p:cNvSpPr>
+          <p:nvPr>
+            <p:ph type="pic" sz="quarter" idx="10"/>
+          </p:nvPr>
+        </p:nvSpPr>
+        <p:spPr/>
+      </p:sp>
+      <p:sp>
+        <p:nvSpPr>
+          <p:cNvPr id="15" name="Title 14">
+            <a:extLst>
+              <a:ext uri="{FF2B5EF4-FFF2-40B4-BE49-F238E27FC236}">
+                <a16:creationId xmlns:a16="http://schemas.microsoft.com/office/drawing/2014/main" id="{6A5A25D4-E266-2DE9-241A-DBC908FBB932}"/>
+              </a:ext>
+            </a:extLst>
+          </p:cNvPr>
+          <p:cNvSpPr>
+            <a:spLocks noGrp="1"/>
+          </p:cNvSpPr>
+          <p:nvPr>
+            <p:ph type="title"/>
+          </p:nvPr>
+        </p:nvSpPr>
+        <p:spPr/>
+        <p:txBody>
+          <a:bodyPr/>
+          <a:lstStyle/>
+          <a:p>
+            <a:r>
+              <a:rPr lang="en-US" dirty="0"/>
+              <a:t>Machine learning</a:t>
+            </a:r>
+          </a:p>
+        </p:txBody>
+      </p:sp>
+      <p:sp>
+        <p:nvSpPr>
+          <p:cNvPr id="2" name="Footer Placeholder 1">
+            <a:extLst>
+              <a:ext uri="{FF2B5EF4-FFF2-40B4-BE49-F238E27FC236}">
+                <a16:creationId xmlns:a16="http://schemas.microsoft.com/office/drawing/2014/main" id="{C40C9D25-8CCB-55BE-B4F9-ECD60CCBC0C0}"/>
+              </a:ext>
+            </a:extLst>
+          </p:cNvPr>
+          <p:cNvSpPr>
+            <a:spLocks noGrp="1"/>
+          </p:cNvSpPr>
+          <p:nvPr>
+            <p:ph type="ftr" sz="quarter" idx="4294967295"/>
+          </p:nvPr>
+        </p:nvSpPr>
+        <p:spPr>
+          <a:xfrm>
+            <a:off x="0" y="6515100"/>
+            <a:ext cx="4114800" cy="206375"/>
+          </a:xfrm>
+        </p:spPr>
+        <p:txBody>
+          <a:bodyPr/>
+          <a:lstStyle/>
+          <a:p>
+            <a:pPr marL="0" marR="0" lvl="0" indent="0" algn="ctr" defTabSz="914400" rtl="0" eaLnBrk="1" fontAlgn="auto" latinLnBrk="0" hangingPunct="1">
+              <a:lnSpc>
+                <a:spcPct val="100000"/>
+              </a:lnSpc>
+              <a:spcBef>
+                <a:spcPts val="0"/>
+              </a:spcBef>
+              <a:spcAft>
+                <a:spcPts val="0"/>
+              </a:spcAft>
+              <a:buClrTx/>
+              <a:buSzTx/>
+              <a:buFontTx/>
+              <a:buNone/>
+              <a:tabLst/>
+              <a:defRPr/>
+            </a:pPr>
+            <a:r>
+              <a:rPr kumimoji="0" lang="en-US" sz="1000" b="0" i="0" u="none" strike="noStrike" kern="1200" cap="all" spc="100" normalizeH="0" baseline="0" noProof="0">
+                <a:ln>
+                  <a:noFill/>
+                </a:ln>
+                <a:solidFill>
+                  <a:prstClr val="white">
+                    <a:lumMod val="50000"/>
+                  </a:prstClr>
+                </a:solidFill>
+                <a:effectLst/>
+                <a:uLnTx/>
+                <a:uFillTx/>
+                <a:latin typeface="Seaford" panose="020B0502030303020204" pitchFamily="34" charset="0"/>
+                <a:ea typeface="+mn-ea"/>
+                <a:cs typeface="+mn-cs"/>
+              </a:rPr>
+              <a:t>PITCH DECK</a:t>
+            </a:r>
+            <a:endParaRPr kumimoji="0" lang="en-US" sz="1000" b="0" i="0" u="none" strike="noStrike" kern="1200" cap="all" spc="100" normalizeH="0" baseline="0" noProof="0" dirty="0">
+              <a:ln>
+                <a:noFill/>
+              </a:ln>
+              <a:solidFill>
+                <a:prstClr val="white">
+                  <a:lumMod val="50000"/>
+                </a:prstClr>
+              </a:solidFill>
+              <a:effectLst/>
+              <a:uLnTx/>
+              <a:uFillTx/>
+              <a:latin typeface="Seaford" panose="020B0502030303020204" pitchFamily="34" charset="0"/>
+              <a:ea typeface="+mn-ea"/>
+              <a:cs typeface="+mn-cs"/>
+            </a:endParaRPr>
+          </a:p>
+        </p:txBody>
+      </p:sp>
+      <p:sp>
+        <p:nvSpPr>
+          <p:cNvPr id="3" name="Slide Number Placeholder 2">
+            <a:extLst>
+              <a:ext uri="{FF2B5EF4-FFF2-40B4-BE49-F238E27FC236}">
+                <a16:creationId xmlns:a16="http://schemas.microsoft.com/office/drawing/2014/main" id="{532E8DA1-508F-BE43-BEC0-C2797046C93B}"/>
+              </a:ext>
+            </a:extLst>
+          </p:cNvPr>
+          <p:cNvSpPr>
+            <a:spLocks noGrp="1"/>
+          </p:cNvSpPr>
+          <p:nvPr>
+            <p:ph type="sldNum" sz="quarter" idx="4294967295"/>
+          </p:nvPr>
+        </p:nvSpPr>
+        <p:spPr>
+          <a:xfrm>
+            <a:off x="9448800" y="6515100"/>
+            <a:ext cx="2743200" cy="206375"/>
+          </a:xfrm>
+        </p:spPr>
+        <p:txBody>
+          <a:bodyPr/>
+          <a:lstStyle/>
+          <a:p>
+            <a:pPr marL="0" marR="0" lvl="0" indent="0" algn="r" defTabSz="914400" rtl="0" eaLnBrk="1" fontAlgn="auto" latinLnBrk="0" hangingPunct="1">
+              <a:lnSpc>
+                <a:spcPct val="100000"/>
+              </a:lnSpc>
+              <a:spcBef>
+                <a:spcPts val="0"/>
+              </a:spcBef>
+              <a:spcAft>
+                <a:spcPts val="0"/>
+              </a:spcAft>
+              <a:buClrTx/>
+              <a:buSzTx/>
+              <a:buFontTx/>
+              <a:buNone/>
+              <a:tabLst/>
+              <a:defRPr/>
+            </a:pPr>
+            <a:fld id="{BF860B6F-2FE3-4DE6-9496-980E987E7466}" type="slidenum">
+              <a:rPr kumimoji="0" lang="en-US" sz="1000" b="0" i="0" u="none" strike="noStrike" kern="1200" cap="all" spc="100" normalizeH="0" baseline="0" noProof="0" smtClean="0">
+                <a:ln>
+                  <a:noFill/>
+                </a:ln>
+                <a:solidFill>
+                  <a:prstClr val="white">
+                    <a:lumMod val="50000"/>
+                  </a:prstClr>
+                </a:solidFill>
+                <a:effectLst/>
+                <a:uLnTx/>
+                <a:uFillTx/>
+                <a:latin typeface="Seaford" panose="020B0502030303020204" pitchFamily="34" charset="0"/>
+                <a:ea typeface="+mn-ea"/>
+                <a:cs typeface="+mn-cs"/>
+              </a:rPr>
+              <a:pPr marL="0" marR="0" lvl="0" indent="0" algn="r" defTabSz="914400" rtl="0" eaLnBrk="1" fontAlgn="auto" latinLnBrk="0" hangingPunct="1">
+                <a:lnSpc>
+                  <a:spcPct val="100000"/>
+                </a:lnSpc>
+                <a:spcBef>
+                  <a:spcPts val="0"/>
+                </a:spcBef>
+                <a:spcAft>
+                  <a:spcPts val="0"/>
+                </a:spcAft>
+                <a:buClrTx/>
+                <a:buSzTx/>
+                <a:buFontTx/>
+                <a:buNone/>
+                <a:tabLst/>
+                <a:defRPr/>
+              </a:pPr>
+              <a:t>12</a:t>
+            </a:fld>
+            <a:endParaRPr kumimoji="0" lang="en-US" sz="1000" b="0" i="0" u="none" strike="noStrike" kern="1200" cap="all" spc="100" normalizeH="0" baseline="0" noProof="0" dirty="0">
+              <a:ln>
+                <a:noFill/>
+              </a:ln>
+              <a:solidFill>
+                <a:prstClr val="white">
+                  <a:lumMod val="50000"/>
+                </a:prstClr>
+              </a:solidFill>
+              <a:effectLst/>
+              <a:uLnTx/>
+              <a:uFillTx/>
+              <a:latin typeface="Seaford" panose="020B0502030303020204" pitchFamily="34" charset="0"/>
+              <a:ea typeface="+mn-ea"/>
+              <a:cs typeface="+mn-cs"/>
+            </a:endParaRPr>
+          </a:p>
+        </p:txBody>
+      </p:sp>
+    </p:spTree>
+    <p:extLst>
+      <p:ext uri="{BB962C8B-B14F-4D97-AF65-F5344CB8AC3E}">
+        <p14:creationId xmlns:p14="http://schemas.microsoft.com/office/powerpoint/2010/main" val="1666669185"/>
+      </p:ext>
+    </p:extLst>
+  </p:cSld>
+  <p:clrMapOvr>
+    <a:masterClrMapping/>
+  </p:clrMapOvr>
+</p:sld>
+</file>
+
+<file path=ppt/slides/slide13.xml><?xml version="1.0" encoding="utf-8"?>
+<p:sld xmlns:a="http://schemas.openxmlformats.org/drawingml/2006/main" xmlns:r="http://schemas.openxmlformats.org/officeDocument/2006/relationships" xmlns:p="http://schemas.openxmlformats.org/presentationml/2006/main">
+  <p:cSld>
+    <p:spTree>
+      <p:nvGrpSpPr>
+        <p:cNvPr id="1" name=""/>
+        <p:cNvGrpSpPr/>
+        <p:nvPr/>
+      </p:nvGrpSpPr>
+      <p:grpSpPr>
+        <a:xfrm>
+          <a:off x="0" y="0"/>
+          <a:ext cx="0" cy="0"/>
+          <a:chOff x="0" y="0"/>
+          <a:chExt cx="0" cy="0"/>
+        </a:xfrm>
+      </p:grpSpPr>
+      <p:sp>
+        <p:nvSpPr>
+          <p:cNvPr id="12" name="Text Placeholder 11">
+            <a:extLst>
+              <a:ext uri="{FF2B5EF4-FFF2-40B4-BE49-F238E27FC236}">
+                <a16:creationId xmlns:a16="http://schemas.microsoft.com/office/drawing/2014/main" id="{97D6B697-C8C7-F8BC-D8C7-B08CAA33DFAF}"/>
+              </a:ext>
+            </a:extLst>
+          </p:cNvPr>
+          <p:cNvSpPr>
+            <a:spLocks noGrp="1"/>
+          </p:cNvSpPr>
+          <p:nvPr>
+            <p:ph type="body" sz="quarter" idx="16"/>
+          </p:nvPr>
+        </p:nvSpPr>
+        <p:spPr/>
+        <p:txBody>
+          <a:bodyPr/>
+          <a:lstStyle/>
+          <a:p>
+            <a:endParaRPr lang="en-US"/>
+          </a:p>
+        </p:txBody>
+      </p:sp>
+      <p:sp>
+        <p:nvSpPr>
+          <p:cNvPr id="13" name="Text Placeholder 12">
+            <a:extLst>
+              <a:ext uri="{FF2B5EF4-FFF2-40B4-BE49-F238E27FC236}">
+                <a16:creationId xmlns:a16="http://schemas.microsoft.com/office/drawing/2014/main" id="{1D7779D1-59CE-C002-9CFE-311BCA72CC45}"/>
+              </a:ext>
+            </a:extLst>
+          </p:cNvPr>
+          <p:cNvSpPr>
+            <a:spLocks noGrp="1"/>
+          </p:cNvSpPr>
+          <p:nvPr>
+            <p:ph type="body" sz="quarter" idx="25"/>
+          </p:nvPr>
+        </p:nvSpPr>
+        <p:spPr/>
+        <p:txBody>
+          <a:bodyPr/>
+          <a:lstStyle/>
+          <a:p>
+            <a:endParaRPr lang="en-US"/>
+          </a:p>
+        </p:txBody>
+      </p:sp>
+      <p:sp>
+        <p:nvSpPr>
+          <p:cNvPr id="14" name="Text Placeholder 13">
+            <a:extLst>
+              <a:ext uri="{FF2B5EF4-FFF2-40B4-BE49-F238E27FC236}">
+                <a16:creationId xmlns:a16="http://schemas.microsoft.com/office/drawing/2014/main" id="{69065E3D-9851-2FFB-9A62-97E891558BCC}"/>
+              </a:ext>
+            </a:extLst>
+          </p:cNvPr>
+          <p:cNvSpPr>
+            <a:spLocks noGrp="1"/>
+          </p:cNvSpPr>
+          <p:nvPr>
+            <p:ph type="body" sz="quarter" idx="34"/>
+          </p:nvPr>
+        </p:nvSpPr>
+        <p:spPr/>
+        <p:txBody>
+          <a:bodyPr/>
+          <a:lstStyle/>
+          <a:p>
+            <a:endParaRPr lang="en-US"/>
+          </a:p>
+        </p:txBody>
+      </p:sp>
+      <p:pic>
+        <p:nvPicPr>
+          <p:cNvPr id="18" name="Content Placeholder 17" descr="A graph of a graph showing the value of a dollar">
+            <a:extLst>
+              <a:ext uri="{FF2B5EF4-FFF2-40B4-BE49-F238E27FC236}">
+                <a16:creationId xmlns:a16="http://schemas.microsoft.com/office/drawing/2014/main" id="{A1FA5988-BD1C-ECD5-C602-0AA2E52ACCA2}"/>
+              </a:ext>
+            </a:extLst>
+          </p:cNvPr>
+          <p:cNvPicPr>
+            <a:picLocks noGrp="1" noChangeAspect="1"/>
+          </p:cNvPicPr>
+          <p:nvPr>
+            <p:ph sz="quarter" idx="37"/>
+          </p:nvPr>
+        </p:nvPicPr>
+        <p:blipFill>
+          <a:blip r:embed="rId2"/>
+          <a:stretch>
+            <a:fillRect/>
+          </a:stretch>
+        </p:blipFill>
+        <p:spPr>
+          <a:xfrm>
+            <a:off x="906463" y="3326039"/>
+            <a:ext cx="5006975" cy="2145846"/>
+          </a:xfrm>
+        </p:spPr>
+      </p:pic>
+      <p:sp>
+        <p:nvSpPr>
+          <p:cNvPr id="16" name="Content Placeholder 15">
+            <a:extLst>
+              <a:ext uri="{FF2B5EF4-FFF2-40B4-BE49-F238E27FC236}">
+                <a16:creationId xmlns:a16="http://schemas.microsoft.com/office/drawing/2014/main" id="{29F2001B-6917-D018-C836-A77473207899}"/>
+              </a:ext>
+            </a:extLst>
+          </p:cNvPr>
+          <p:cNvSpPr>
+            <a:spLocks noGrp="1"/>
+          </p:cNvSpPr>
+          <p:nvPr>
+            <p:ph sz="quarter" idx="38"/>
+          </p:nvPr>
+        </p:nvSpPr>
+        <p:spPr/>
+        <p:txBody>
+          <a:bodyPr/>
+          <a:lstStyle/>
+          <a:p>
+            <a:r>
+              <a:rPr lang="en-US" dirty="0" err="1"/>
+              <a:t>KMeans</a:t>
+            </a:r>
+            <a:r>
+              <a:rPr lang="en-US" dirty="0"/>
+              <a:t> with 5 clusters provided best model</a:t>
+            </a:r>
+          </a:p>
+          <a:p>
+            <a:r>
+              <a:rPr lang="en-US" dirty="0"/>
+              <a:t>Functional model, but not best approach overall</a:t>
+            </a:r>
+          </a:p>
+        </p:txBody>
+      </p:sp>
+      <p:sp>
+        <p:nvSpPr>
+          <p:cNvPr id="11" name="Title 10">
+            <a:extLst>
+              <a:ext uri="{FF2B5EF4-FFF2-40B4-BE49-F238E27FC236}">
+                <a16:creationId xmlns:a16="http://schemas.microsoft.com/office/drawing/2014/main" id="{2CA8B2D7-5A24-E917-6118-B1C87CEE7AB0}"/>
+              </a:ext>
+            </a:extLst>
+          </p:cNvPr>
+          <p:cNvSpPr>
+            <a:spLocks noGrp="1"/>
+          </p:cNvSpPr>
+          <p:nvPr>
+            <p:ph type="title"/>
+          </p:nvPr>
+        </p:nvSpPr>
+        <p:spPr>
+          <a:xfrm>
+            <a:off x="827899" y="671808"/>
+            <a:ext cx="9430525" cy="639192"/>
+          </a:xfrm>
+        </p:spPr>
+        <p:txBody>
+          <a:bodyPr/>
+          <a:lstStyle/>
+          <a:p>
+            <a:r>
+              <a:rPr lang="en-US" dirty="0"/>
+              <a:t>Unsupervised learning</a:t>
+            </a:r>
+          </a:p>
+        </p:txBody>
+      </p:sp>
+    </p:spTree>
+    <p:extLst>
+      <p:ext uri="{BB962C8B-B14F-4D97-AF65-F5344CB8AC3E}">
+        <p14:creationId xmlns:p14="http://schemas.microsoft.com/office/powerpoint/2010/main" val="693239803"/>
+      </p:ext>
+    </p:extLst>
+  </p:cSld>
+  <p:clrMapOvr>
+    <a:masterClrMapping/>
+  </p:clrMapOvr>
+</p:sld>
+</file>
+
+<file path=ppt/slides/slide14.xml><?xml version="1.0" encoding="utf-8"?>
+<p:sld xmlns:a="http://schemas.openxmlformats.org/drawingml/2006/main" xmlns:r="http://schemas.openxmlformats.org/officeDocument/2006/relationships" xmlns:p="http://schemas.openxmlformats.org/presentationml/2006/main">
+  <p:cSld>
+    <p:spTree>
+      <p:nvGrpSpPr>
+        <p:cNvPr id="1" name=""/>
+        <p:cNvGrpSpPr/>
+        <p:nvPr/>
+      </p:nvGrpSpPr>
+      <p:grpSpPr>
+        <a:xfrm>
+          <a:off x="0" y="0"/>
+          <a:ext cx="0" cy="0"/>
+          <a:chOff x="0" y="0"/>
+          <a:chExt cx="0" cy="0"/>
+        </a:xfrm>
+      </p:grpSpPr>
+      <p:pic>
+        <p:nvPicPr>
+          <p:cNvPr id="73" name="Picture Placeholder 72" descr="A green and blue circuit board pattern&#10;&#10;Description automatically generated">
+            <a:extLst>
+              <a:ext uri="{FF2B5EF4-FFF2-40B4-BE49-F238E27FC236}">
+                <a16:creationId xmlns:a16="http://schemas.microsoft.com/office/drawing/2014/main" id="{2E64027D-CE85-0420-CB12-456A6B44C1CC}"/>
+              </a:ext>
+            </a:extLst>
+          </p:cNvPr>
+          <p:cNvPicPr>
+            <a:picLocks noGrp="1" noChangeAspect="1"/>
+          </p:cNvPicPr>
+          <p:nvPr>
+            <p:ph type="pic" sz="quarter" idx="16"/>
+          </p:nvPr>
+        </p:nvPicPr>
+        <p:blipFill>
+          <a:blip r:embed="rId2"/>
+          <a:srcRect l="26939" r="26939"/>
+          <a:stretch>
+            <a:fillRect/>
+          </a:stretch>
+        </p:blipFill>
+        <p:spPr/>
+      </p:pic>
+      <p:sp>
+        <p:nvSpPr>
+          <p:cNvPr id="2" name="Footer Placeholder 1">
+            <a:extLst>
+              <a:ext uri="{FF2B5EF4-FFF2-40B4-BE49-F238E27FC236}">
+                <a16:creationId xmlns:a16="http://schemas.microsoft.com/office/drawing/2014/main" id="{B40437DE-8AD8-E31E-AEAC-C2F7DBD36512}"/>
+              </a:ext>
+            </a:extLst>
+          </p:cNvPr>
+          <p:cNvSpPr>
+            <a:spLocks noGrp="1"/>
+          </p:cNvSpPr>
+          <p:nvPr>
+            <p:ph type="ftr" sz="quarter" idx="11"/>
+          </p:nvPr>
+        </p:nvSpPr>
+        <p:spPr/>
+        <p:txBody>
+          <a:bodyPr/>
+          <a:lstStyle/>
+          <a:p>
+            <a:pPr marL="0" marR="0" lvl="0" indent="0" algn="ctr" defTabSz="914400" rtl="0" eaLnBrk="1" fontAlgn="auto" latinLnBrk="0" hangingPunct="1">
+              <a:lnSpc>
+                <a:spcPct val="100000"/>
+              </a:lnSpc>
+              <a:spcBef>
+                <a:spcPts val="0"/>
+              </a:spcBef>
+              <a:spcAft>
+                <a:spcPts val="0"/>
+              </a:spcAft>
+              <a:buClrTx/>
+              <a:buSzTx/>
+              <a:buFontTx/>
+              <a:buNone/>
+              <a:tabLst/>
+              <a:defRPr/>
+            </a:pPr>
+            <a:r>
+              <a:rPr kumimoji="0" lang="en-US" sz="1000" b="0" i="0" u="none" strike="noStrike" kern="1200" cap="all" spc="100" normalizeH="0" baseline="0" noProof="0">
+                <a:ln>
+                  <a:noFill/>
+                </a:ln>
+                <a:solidFill>
+                  <a:srgbClr val="E7E6E6">
+                    <a:lumMod val="50000"/>
+                  </a:srgbClr>
+                </a:solidFill>
+                <a:effectLst/>
+                <a:uLnTx/>
+                <a:uFillTx/>
+                <a:latin typeface="Seaford" panose="020B0502030303020204" pitchFamily="34" charset="0"/>
+                <a:ea typeface="+mn-ea"/>
+                <a:cs typeface="+mn-cs"/>
+              </a:rPr>
+              <a:t>PITCH DECK</a:t>
+            </a:r>
+            <a:endParaRPr kumimoji="0" lang="en-US" sz="1000" b="0" i="0" u="none" strike="noStrike" kern="1200" cap="all" spc="100" normalizeH="0" baseline="0" noProof="0" dirty="0">
+              <a:ln>
+                <a:noFill/>
+              </a:ln>
+              <a:solidFill>
+                <a:srgbClr val="E7E6E6">
+                  <a:lumMod val="50000"/>
+                </a:srgbClr>
+              </a:solidFill>
+              <a:effectLst/>
+              <a:uLnTx/>
+              <a:uFillTx/>
+              <a:latin typeface="Seaford" panose="020B0502030303020204" pitchFamily="34" charset="0"/>
+              <a:ea typeface="+mn-ea"/>
+              <a:cs typeface="+mn-cs"/>
+            </a:endParaRPr>
+          </a:p>
+        </p:txBody>
+      </p:sp>
+      <p:sp>
+        <p:nvSpPr>
+          <p:cNvPr id="3" name="Slide Number Placeholder 2">
+            <a:extLst>
+              <a:ext uri="{FF2B5EF4-FFF2-40B4-BE49-F238E27FC236}">
+                <a16:creationId xmlns:a16="http://schemas.microsoft.com/office/drawing/2014/main" id="{DFE80EB8-1298-8336-8C2E-55AA689D4DD3}"/>
+              </a:ext>
+            </a:extLst>
+          </p:cNvPr>
+          <p:cNvSpPr>
+            <a:spLocks noGrp="1"/>
+          </p:cNvSpPr>
+          <p:nvPr>
+            <p:ph type="sldNum" sz="quarter" idx="12"/>
+          </p:nvPr>
+        </p:nvSpPr>
+        <p:spPr/>
+        <p:txBody>
+          <a:bodyPr/>
+          <a:lstStyle/>
+          <a:p>
+            <a:pPr marL="0" marR="0" lvl="0" indent="0" algn="r" defTabSz="914400" rtl="0" eaLnBrk="1" fontAlgn="auto" latinLnBrk="0" hangingPunct="1">
+              <a:lnSpc>
+                <a:spcPct val="100000"/>
+              </a:lnSpc>
+              <a:spcBef>
+                <a:spcPts val="0"/>
+              </a:spcBef>
+              <a:spcAft>
+                <a:spcPts val="0"/>
+              </a:spcAft>
+              <a:buClrTx/>
+              <a:buSzTx/>
+              <a:buFontTx/>
+              <a:buNone/>
+              <a:tabLst/>
+              <a:defRPr/>
+            </a:pPr>
+            <a:fld id="{BF860B6F-2FE3-4DE6-9496-980E987E7466}" type="slidenum">
+              <a:rPr kumimoji="0" lang="en-US" sz="1000" b="0" i="0" u="none" strike="noStrike" kern="1200" cap="all" spc="100" normalizeH="0" baseline="0" noProof="0" smtClean="0">
+                <a:ln>
+                  <a:noFill/>
+                </a:ln>
+                <a:solidFill>
+                  <a:srgbClr val="E7E6E6">
+                    <a:lumMod val="50000"/>
+                  </a:srgbClr>
+                </a:solidFill>
+                <a:effectLst/>
+                <a:uLnTx/>
+                <a:uFillTx/>
+                <a:latin typeface="Seaford" panose="020B0502030303020204" pitchFamily="34" charset="0"/>
+                <a:ea typeface="+mn-ea"/>
+                <a:cs typeface="+mn-cs"/>
+              </a:rPr>
+              <a:pPr marL="0" marR="0" lvl="0" indent="0" algn="r" defTabSz="914400" rtl="0" eaLnBrk="1" fontAlgn="auto" latinLnBrk="0" hangingPunct="1">
+                <a:lnSpc>
+                  <a:spcPct val="100000"/>
+                </a:lnSpc>
+                <a:spcBef>
+                  <a:spcPts val="0"/>
+                </a:spcBef>
+                <a:spcAft>
+                  <a:spcPts val="0"/>
+                </a:spcAft>
+                <a:buClrTx/>
+                <a:buSzTx/>
+                <a:buFontTx/>
+                <a:buNone/>
+                <a:tabLst/>
+                <a:defRPr/>
+              </a:pPr>
+              <a:t>14</a:t>
+            </a:fld>
+            <a:endParaRPr kumimoji="0" lang="en-US" sz="1000" b="0" i="0" u="none" strike="noStrike" kern="1200" cap="all" spc="100" normalizeH="0" baseline="0" noProof="0" dirty="0">
+              <a:ln>
+                <a:noFill/>
+              </a:ln>
+              <a:solidFill>
+                <a:srgbClr val="E7E6E6">
+                  <a:lumMod val="50000"/>
+                </a:srgbClr>
+              </a:solidFill>
+              <a:effectLst/>
+              <a:uLnTx/>
+              <a:uFillTx/>
+              <a:latin typeface="Seaford" panose="020B0502030303020204" pitchFamily="34" charset="0"/>
+              <a:ea typeface="+mn-ea"/>
+              <a:cs typeface="+mn-cs"/>
+            </a:endParaRPr>
+          </a:p>
+        </p:txBody>
+      </p:sp>
+      <p:sp>
+        <p:nvSpPr>
+          <p:cNvPr id="69" name="Text Placeholder 68">
+            <a:extLst>
+              <a:ext uri="{FF2B5EF4-FFF2-40B4-BE49-F238E27FC236}">
+                <a16:creationId xmlns:a16="http://schemas.microsoft.com/office/drawing/2014/main" id="{CA4B456E-A003-CCE5-5133-5EAA366F4556}"/>
+              </a:ext>
+            </a:extLst>
+          </p:cNvPr>
+          <p:cNvSpPr>
+            <a:spLocks noGrp="1"/>
+          </p:cNvSpPr>
+          <p:nvPr>
+            <p:ph type="body" sz="quarter" idx="13"/>
+          </p:nvPr>
+        </p:nvSpPr>
+        <p:spPr/>
+        <p:txBody>
+          <a:bodyPr/>
+          <a:lstStyle/>
+          <a:p>
+            <a:r>
+              <a:rPr lang="en-US" dirty="0"/>
+              <a:t>Created dummies for all variables except the suicide rate. Failed to exceed 1% accuracy</a:t>
+            </a:r>
+          </a:p>
+          <a:p>
+            <a:endParaRPr lang="en-US" dirty="0"/>
+          </a:p>
+        </p:txBody>
+      </p:sp>
+      <p:sp>
+        <p:nvSpPr>
+          <p:cNvPr id="63" name="Text Placeholder 62">
+            <a:extLst>
+              <a:ext uri="{FF2B5EF4-FFF2-40B4-BE49-F238E27FC236}">
+                <a16:creationId xmlns:a16="http://schemas.microsoft.com/office/drawing/2014/main" id="{45BDD8B1-02C9-895A-FA99-08E371730071}"/>
+              </a:ext>
+            </a:extLst>
+          </p:cNvPr>
+          <p:cNvSpPr>
+            <a:spLocks noGrp="1"/>
+          </p:cNvSpPr>
+          <p:nvPr>
+            <p:ph type="body" sz="quarter" idx="17"/>
+          </p:nvPr>
+        </p:nvSpPr>
+        <p:spPr/>
+        <p:txBody>
+          <a:bodyPr/>
+          <a:lstStyle/>
+          <a:p>
+            <a:r>
+              <a:rPr lang="en-US" dirty="0"/>
+              <a:t>First approach</a:t>
+            </a:r>
+          </a:p>
+        </p:txBody>
+      </p:sp>
+      <p:sp>
+        <p:nvSpPr>
+          <p:cNvPr id="64" name="Text Placeholder 63">
+            <a:extLst>
+              <a:ext uri="{FF2B5EF4-FFF2-40B4-BE49-F238E27FC236}">
+                <a16:creationId xmlns:a16="http://schemas.microsoft.com/office/drawing/2014/main" id="{DE828122-4A15-6235-D459-5597673DCA06}"/>
+              </a:ext>
+            </a:extLst>
+          </p:cNvPr>
+          <p:cNvSpPr>
+            <a:spLocks noGrp="1"/>
+          </p:cNvSpPr>
+          <p:nvPr>
+            <p:ph type="body" sz="quarter" idx="18"/>
+          </p:nvPr>
+        </p:nvSpPr>
+        <p:spPr/>
+        <p:txBody>
+          <a:bodyPr/>
+          <a:lstStyle/>
+          <a:p>
+            <a:r>
+              <a:rPr lang="en-US" dirty="0"/>
+              <a:t>Fewer variables, using only dummies for sex and age. Better, but failed to exceed 10% accuracy</a:t>
+            </a:r>
+          </a:p>
+          <a:p>
+            <a:endParaRPr lang="en-US" dirty="0"/>
+          </a:p>
+        </p:txBody>
+      </p:sp>
+      <p:sp>
+        <p:nvSpPr>
+          <p:cNvPr id="65" name="Text Placeholder 64">
+            <a:extLst>
+              <a:ext uri="{FF2B5EF4-FFF2-40B4-BE49-F238E27FC236}">
+                <a16:creationId xmlns:a16="http://schemas.microsoft.com/office/drawing/2014/main" id="{C09DBAAA-A892-069F-0C73-E3983B269E15}"/>
+              </a:ext>
+            </a:extLst>
+          </p:cNvPr>
+          <p:cNvSpPr>
+            <a:spLocks noGrp="1"/>
+          </p:cNvSpPr>
+          <p:nvPr>
+            <p:ph type="body" sz="quarter" idx="19"/>
+          </p:nvPr>
+        </p:nvSpPr>
+        <p:spPr/>
+        <p:txBody>
+          <a:bodyPr/>
+          <a:lstStyle/>
+          <a:p>
+            <a:r>
+              <a:rPr lang="en-US" dirty="0"/>
+              <a:t>Second approach</a:t>
+            </a:r>
+          </a:p>
+        </p:txBody>
+      </p:sp>
+      <p:sp>
+        <p:nvSpPr>
+          <p:cNvPr id="66" name="Text Placeholder 65">
+            <a:extLst>
+              <a:ext uri="{FF2B5EF4-FFF2-40B4-BE49-F238E27FC236}">
+                <a16:creationId xmlns:a16="http://schemas.microsoft.com/office/drawing/2014/main" id="{1D051850-639B-E87B-D7F1-CB1AE4DB5F37}"/>
+              </a:ext>
+            </a:extLst>
+          </p:cNvPr>
+          <p:cNvSpPr>
+            <a:spLocks noGrp="1"/>
+          </p:cNvSpPr>
+          <p:nvPr>
+            <p:ph type="body" sz="quarter" idx="20"/>
+          </p:nvPr>
+        </p:nvSpPr>
+        <p:spPr/>
+        <p:txBody>
+          <a:bodyPr/>
+          <a:lstStyle/>
+          <a:p>
+            <a:r>
+              <a:rPr lang="en-US" dirty="0"/>
+              <a:t>Created suicide rate buckets, all variables included again.</a:t>
+            </a:r>
+          </a:p>
+          <a:p>
+            <a:r>
+              <a:rPr lang="en-US" dirty="0"/>
+              <a:t>Accuracy still an issue</a:t>
+            </a:r>
+          </a:p>
+          <a:p>
+            <a:endParaRPr lang="en-US" dirty="0"/>
+          </a:p>
+        </p:txBody>
+      </p:sp>
+      <p:sp>
+        <p:nvSpPr>
+          <p:cNvPr id="67" name="Text Placeholder 66">
+            <a:extLst>
+              <a:ext uri="{FF2B5EF4-FFF2-40B4-BE49-F238E27FC236}">
+                <a16:creationId xmlns:a16="http://schemas.microsoft.com/office/drawing/2014/main" id="{EBEB1EB1-4965-085C-0E17-A287AD4B8BA0}"/>
+              </a:ext>
+            </a:extLst>
+          </p:cNvPr>
+          <p:cNvSpPr>
+            <a:spLocks noGrp="1"/>
+          </p:cNvSpPr>
+          <p:nvPr>
+            <p:ph type="body" sz="quarter" idx="21"/>
+          </p:nvPr>
+        </p:nvSpPr>
+        <p:spPr/>
+        <p:txBody>
+          <a:bodyPr/>
+          <a:lstStyle/>
+          <a:p>
+            <a:endParaRPr lang="en-US" dirty="0"/>
+          </a:p>
+          <a:p>
+            <a:r>
+              <a:rPr lang="en-US" dirty="0"/>
+              <a:t>Third approach</a:t>
+            </a:r>
+          </a:p>
+        </p:txBody>
+      </p:sp>
+      <p:sp>
+        <p:nvSpPr>
+          <p:cNvPr id="68" name="Text Placeholder 67">
+            <a:extLst>
+              <a:ext uri="{FF2B5EF4-FFF2-40B4-BE49-F238E27FC236}">
+                <a16:creationId xmlns:a16="http://schemas.microsoft.com/office/drawing/2014/main" id="{0A1E7B0C-68BF-DB70-8673-E5EDFA4A5D22}"/>
+              </a:ext>
+            </a:extLst>
+          </p:cNvPr>
+          <p:cNvSpPr>
+            <a:spLocks noGrp="1"/>
+          </p:cNvSpPr>
+          <p:nvPr>
+            <p:ph type="body" sz="quarter" idx="22"/>
+          </p:nvPr>
+        </p:nvSpPr>
+        <p:spPr/>
+        <p:txBody>
+          <a:bodyPr/>
+          <a:lstStyle/>
+          <a:p>
+            <a:r>
+              <a:rPr lang="en-US" dirty="0" err="1"/>
+              <a:t>Hypertuned</a:t>
+            </a:r>
+            <a:r>
+              <a:rPr lang="en-US" dirty="0"/>
+              <a:t> with </a:t>
+            </a:r>
+            <a:r>
+              <a:rPr lang="en-US" dirty="0" err="1"/>
+              <a:t>Keras</a:t>
+            </a:r>
+            <a:r>
+              <a:rPr lang="en-US" dirty="0"/>
+              <a:t> Tuner</a:t>
+            </a:r>
+          </a:p>
+          <a:p>
+            <a:r>
+              <a:rPr lang="en-US" dirty="0"/>
+              <a:t>Successfully exceed 85% accuracy</a:t>
+            </a:r>
+          </a:p>
+        </p:txBody>
+      </p:sp>
+      <p:sp>
+        <p:nvSpPr>
+          <p:cNvPr id="71" name="Text Placeholder 70">
+            <a:extLst>
+              <a:ext uri="{FF2B5EF4-FFF2-40B4-BE49-F238E27FC236}">
+                <a16:creationId xmlns:a16="http://schemas.microsoft.com/office/drawing/2014/main" id="{76AC9193-8F80-6935-F1B4-444812D51150}"/>
+              </a:ext>
+            </a:extLst>
+          </p:cNvPr>
+          <p:cNvSpPr>
+            <a:spLocks noGrp="1"/>
+          </p:cNvSpPr>
+          <p:nvPr>
+            <p:ph type="body" sz="quarter" idx="23"/>
+          </p:nvPr>
+        </p:nvSpPr>
+        <p:spPr/>
+        <p:txBody>
+          <a:bodyPr/>
+          <a:lstStyle/>
+          <a:p>
+            <a:r>
+              <a:rPr lang="en-US" dirty="0"/>
+              <a:t>Final approach</a:t>
+            </a:r>
+          </a:p>
+        </p:txBody>
+      </p:sp>
+      <p:sp>
+        <p:nvSpPr>
+          <p:cNvPr id="61" name="Title 60">
+            <a:extLst>
+              <a:ext uri="{FF2B5EF4-FFF2-40B4-BE49-F238E27FC236}">
+                <a16:creationId xmlns:a16="http://schemas.microsoft.com/office/drawing/2014/main" id="{1A031169-E597-D73E-0A2B-A57825919B2B}"/>
+              </a:ext>
+            </a:extLst>
+          </p:cNvPr>
+          <p:cNvSpPr>
+            <a:spLocks noGrp="1"/>
+          </p:cNvSpPr>
+          <p:nvPr>
+            <p:ph type="title"/>
+          </p:nvPr>
+        </p:nvSpPr>
+        <p:spPr/>
+        <p:txBody>
+          <a:bodyPr/>
+          <a:lstStyle/>
+          <a:p>
+            <a:r>
+              <a:rPr lang="en-US" dirty="0"/>
+              <a:t>Neural net</a:t>
+            </a:r>
+          </a:p>
+        </p:txBody>
+      </p:sp>
+    </p:spTree>
+    <p:extLst>
+      <p:ext uri="{BB962C8B-B14F-4D97-AF65-F5344CB8AC3E}">
+        <p14:creationId xmlns:p14="http://schemas.microsoft.com/office/powerpoint/2010/main" val="292092132"/>
+      </p:ext>
+    </p:extLst>
+  </p:cSld>
+  <p:clrMapOvr>
+    <a:masterClrMapping/>
+  </p:clrMapOvr>
+</p:sld>
+</file>
+
+<file path=ppt/slides/slide15.xml><?xml version="1.0" encoding="utf-8"?>
+<p:sld xmlns:a="http://schemas.openxmlformats.org/drawingml/2006/main" xmlns:r="http://schemas.openxmlformats.org/officeDocument/2006/relationships" xmlns:p="http://schemas.openxmlformats.org/presentationml/2006/main">
+  <p:cSld>
+    <p:spTree>
+      <p:nvGrpSpPr>
+        <p:cNvPr id="1" name=""/>
+        <p:cNvGrpSpPr/>
+        <p:nvPr/>
+      </p:nvGrpSpPr>
+      <p:grpSpPr>
+        <a:xfrm>
+          <a:off x="0" y="0"/>
+          <a:ext cx="0" cy="0"/>
+          <a:chOff x="0" y="0"/>
+          <a:chExt cx="0" cy="0"/>
+        </a:xfrm>
+      </p:grpSpPr>
+      <p:sp>
+        <p:nvSpPr>
+          <p:cNvPr id="15" name="Picture Placeholder 14">
+            <a:extLst>
+              <a:ext uri="{FF2B5EF4-FFF2-40B4-BE49-F238E27FC236}">
+                <a16:creationId xmlns:a16="http://schemas.microsoft.com/office/drawing/2014/main" id="{4DFAB8C8-A4A2-C1A8-0BFD-BEA4644CCA08}"/>
+              </a:ext>
+            </a:extLst>
+          </p:cNvPr>
+          <p:cNvSpPr>
+            <a:spLocks noGrp="1"/>
+          </p:cNvSpPr>
+          <p:nvPr>
+            <p:ph type="pic" sz="quarter" idx="10"/>
+          </p:nvPr>
+        </p:nvSpPr>
+        <p:spPr/>
+      </p:sp>
+      <p:sp>
+        <p:nvSpPr>
+          <p:cNvPr id="14" name="Title 13">
+            <a:extLst>
+              <a:ext uri="{FF2B5EF4-FFF2-40B4-BE49-F238E27FC236}">
+                <a16:creationId xmlns:a16="http://schemas.microsoft.com/office/drawing/2014/main" id="{06632BC0-B175-6041-20E4-FDAB7D54D67C}"/>
+              </a:ext>
+            </a:extLst>
+          </p:cNvPr>
+          <p:cNvSpPr>
+            <a:spLocks noGrp="1"/>
+          </p:cNvSpPr>
+          <p:nvPr>
+            <p:ph type="title"/>
+          </p:nvPr>
+        </p:nvSpPr>
+        <p:spPr/>
+        <p:txBody>
+          <a:bodyPr/>
+          <a:lstStyle/>
+          <a:p>
+            <a:r>
+              <a:rPr lang="en-US"/>
+              <a:t>Thank you</a:t>
+            </a:r>
+          </a:p>
+        </p:txBody>
+      </p:sp>
+      <p:sp>
+        <p:nvSpPr>
+          <p:cNvPr id="3" name="Footer Placeholder 2">
+            <a:extLst>
+              <a:ext uri="{FF2B5EF4-FFF2-40B4-BE49-F238E27FC236}">
+                <a16:creationId xmlns:a16="http://schemas.microsoft.com/office/drawing/2014/main" id="{9D5582FB-70F4-EA76-08E3-4D19E70107DB}"/>
+              </a:ext>
+            </a:extLst>
+          </p:cNvPr>
+          <p:cNvSpPr>
+            <a:spLocks noGrp="1"/>
+          </p:cNvSpPr>
+          <p:nvPr>
+            <p:ph type="ftr" sz="quarter" idx="4294967295"/>
+          </p:nvPr>
+        </p:nvSpPr>
+        <p:spPr>
+          <a:xfrm>
+            <a:off x="0" y="6515100"/>
+            <a:ext cx="4114800" cy="206375"/>
+          </a:xfrm>
+        </p:spPr>
+        <p:txBody>
+          <a:bodyPr/>
+          <a:lstStyle/>
+          <a:p>
+            <a:pPr marL="0" marR="0" lvl="0" indent="0" algn="ctr" defTabSz="914400" rtl="0" eaLnBrk="1" fontAlgn="auto" latinLnBrk="0" hangingPunct="1">
+              <a:lnSpc>
+                <a:spcPct val="100000"/>
+              </a:lnSpc>
+              <a:spcBef>
+                <a:spcPts val="0"/>
+              </a:spcBef>
+              <a:spcAft>
+                <a:spcPts val="0"/>
+              </a:spcAft>
+              <a:buClrTx/>
+              <a:buSzTx/>
+              <a:buFontTx/>
+              <a:buNone/>
+              <a:tabLst/>
+              <a:defRPr/>
+            </a:pPr>
+            <a:r>
+              <a:rPr kumimoji="0" lang="en-US" sz="1000" b="0" i="0" u="none" strike="noStrike" kern="1200" cap="all" spc="100" normalizeH="0" baseline="0" noProof="0">
+                <a:ln>
+                  <a:noFill/>
+                </a:ln>
+                <a:solidFill>
+                  <a:prstClr val="white">
+                    <a:lumMod val="50000"/>
+                  </a:prstClr>
+                </a:solidFill>
+                <a:effectLst/>
+                <a:uLnTx/>
+                <a:uFillTx/>
+                <a:latin typeface="Seaford" panose="020B0502030303020204" pitchFamily="34" charset="0"/>
+                <a:ea typeface="+mn-ea"/>
+                <a:cs typeface="+mn-cs"/>
+              </a:rPr>
+              <a:t>PITCH DECK</a:t>
+            </a:r>
+            <a:endParaRPr kumimoji="0" lang="en-US" sz="1000" b="0" i="0" u="none" strike="noStrike" kern="1200" cap="all" spc="100" normalizeH="0" baseline="0" noProof="0" dirty="0">
+              <a:ln>
+                <a:noFill/>
+              </a:ln>
+              <a:solidFill>
+                <a:prstClr val="white">
+                  <a:lumMod val="50000"/>
+                </a:prstClr>
+              </a:solidFill>
+              <a:effectLst/>
+              <a:uLnTx/>
+              <a:uFillTx/>
+              <a:latin typeface="Seaford" panose="020B0502030303020204" pitchFamily="34" charset="0"/>
+              <a:ea typeface="+mn-ea"/>
+              <a:cs typeface="+mn-cs"/>
+            </a:endParaRPr>
+          </a:p>
+        </p:txBody>
+      </p:sp>
+      <p:sp>
+        <p:nvSpPr>
+          <p:cNvPr id="4" name="Slide Number Placeholder 3">
+            <a:extLst>
+              <a:ext uri="{FF2B5EF4-FFF2-40B4-BE49-F238E27FC236}">
+                <a16:creationId xmlns:a16="http://schemas.microsoft.com/office/drawing/2014/main" id="{28DD684C-6730-BDD2-C4F7-46DA3BB59524}"/>
+              </a:ext>
+            </a:extLst>
+          </p:cNvPr>
+          <p:cNvSpPr>
+            <a:spLocks noGrp="1"/>
+          </p:cNvSpPr>
+          <p:nvPr>
+            <p:ph type="sldNum" sz="quarter" idx="4294967295"/>
+          </p:nvPr>
+        </p:nvSpPr>
+        <p:spPr>
+          <a:xfrm>
+            <a:off x="9448800" y="6515100"/>
+            <a:ext cx="2743200" cy="206375"/>
+          </a:xfrm>
+        </p:spPr>
+        <p:txBody>
+          <a:bodyPr/>
+          <a:lstStyle/>
+          <a:p>
+            <a:pPr marL="0" marR="0" lvl="0" indent="0" algn="r" defTabSz="914400" rtl="0" eaLnBrk="1" fontAlgn="auto" latinLnBrk="0" hangingPunct="1">
+              <a:lnSpc>
+                <a:spcPct val="100000"/>
+              </a:lnSpc>
+              <a:spcBef>
+                <a:spcPts val="0"/>
+              </a:spcBef>
+              <a:spcAft>
+                <a:spcPts val="0"/>
+              </a:spcAft>
+              <a:buClrTx/>
+              <a:buSzTx/>
+              <a:buFontTx/>
+              <a:buNone/>
+              <a:tabLst/>
+              <a:defRPr/>
+            </a:pPr>
+            <a:fld id="{BF860B6F-2FE3-4DE6-9496-980E987E7466}" type="slidenum">
+              <a:rPr kumimoji="0" lang="en-US" sz="1000" b="0" i="0" u="none" strike="noStrike" kern="1200" cap="all" spc="100" normalizeH="0" baseline="0" noProof="0" smtClean="0">
+                <a:ln>
+                  <a:noFill/>
+                </a:ln>
+                <a:solidFill>
+                  <a:prstClr val="white">
+                    <a:lumMod val="50000"/>
+                  </a:prstClr>
+                </a:solidFill>
+                <a:effectLst/>
+                <a:uLnTx/>
+                <a:uFillTx/>
+                <a:latin typeface="Seaford" panose="020B0502030303020204" pitchFamily="34" charset="0"/>
+                <a:ea typeface="+mn-ea"/>
+                <a:cs typeface="+mn-cs"/>
+              </a:rPr>
+              <a:pPr marL="0" marR="0" lvl="0" indent="0" algn="r" defTabSz="914400" rtl="0" eaLnBrk="1" fontAlgn="auto" latinLnBrk="0" hangingPunct="1">
+                <a:lnSpc>
+                  <a:spcPct val="100000"/>
+                </a:lnSpc>
+                <a:spcBef>
+                  <a:spcPts val="0"/>
+                </a:spcBef>
+                <a:spcAft>
+                  <a:spcPts val="0"/>
+                </a:spcAft>
+                <a:buClrTx/>
+                <a:buSzTx/>
+                <a:buFontTx/>
+                <a:buNone/>
+                <a:tabLst/>
+                <a:defRPr/>
+              </a:pPr>
+              <a:t>15</a:t>
+            </a:fld>
+            <a:endParaRPr kumimoji="0" lang="en-US" sz="1000" b="0" i="0" u="none" strike="noStrike" kern="1200" cap="all" spc="100" normalizeH="0" baseline="0" noProof="0" dirty="0">
+              <a:ln>
+                <a:noFill/>
+              </a:ln>
+              <a:solidFill>
+                <a:prstClr val="white">
+                  <a:lumMod val="50000"/>
+                </a:prstClr>
+              </a:solidFill>
+              <a:effectLst/>
+              <a:uLnTx/>
+              <a:uFillTx/>
+              <a:latin typeface="Seaford" panose="020B0502030303020204" pitchFamily="34" charset="0"/>
+              <a:ea typeface="+mn-ea"/>
+              <a:cs typeface="+mn-cs"/>
+            </a:endParaRPr>
+          </a:p>
+        </p:txBody>
+      </p:sp>
+    </p:spTree>
+    <p:extLst>
+      <p:ext uri="{BB962C8B-B14F-4D97-AF65-F5344CB8AC3E}">
+        <p14:creationId xmlns:p14="http://schemas.microsoft.com/office/powerpoint/2010/main" val="3671300144"/>
+      </p:ext>
+    </p:extLst>
+  </p:cSld>
+  <p:clrMapOvr>
+    <a:masterClrMapping/>
+  </p:clrMapOvr>
+</p:sld>
+</file>
+
 <file path=ppt/slides/slide2.xml><?xml version="1.0" encoding="utf-8"?>
 <p:sld xmlns:a="http://schemas.openxmlformats.org/drawingml/2006/main" xmlns:r="http://schemas.openxmlformats.org/officeDocument/2006/relationships" xmlns:p="http://schemas.openxmlformats.org/presentationml/2006/main">
   <p:cSld>
@@ -42144,6 +43375,15 @@
 </file>
 
 <file path=customXml/item1.xml><?xml version="1.0" encoding="utf-8"?>
+<?mso-contentType ?>
+<FormTemplates xmlns="http://schemas.microsoft.com/sharepoint/v3/contenttype/forms">
+  <Display>DocumentLibraryForm</Display>
+  <Edit>DocumentLibraryForm</Edit>
+  <New>DocumentLibraryForm</New>
+</FormTemplates>
+</file>
+
+<file path=customXml/item2.xml><?xml version="1.0" encoding="utf-8"?>
 <ct:contentTypeSchema xmlns:ct="http://schemas.microsoft.com/office/2006/metadata/contentType" xmlns:ma="http://schemas.microsoft.com/office/2006/metadata/properties/metaAttributes" ct:_="" ma:_="" ma:contentTypeName="Document" ma:contentTypeID="0x01010079F111ED35F8CC479449609E8A0923A6" ma:contentTypeVersion="21" ma:contentTypeDescription="Create a new document." ma:contentTypeScope="" ma:versionID="64dfb1555687e0874b4304b796b5b0c7">
   <xsd:schema xmlns:xsd="http://www.w3.org/2001/XMLSchema" xmlns:xs="http://www.w3.org/2001/XMLSchema" xmlns:p="http://schemas.microsoft.com/office/2006/metadata/properties" xmlns:ns1="http://schemas.microsoft.com/sharepoint/v3" xmlns:ns2="71af3243-3dd4-4a8d-8c0d-dd76da1f02a5" xmlns:ns3="16c05727-aa75-4e4a-9b5f-8a80a1165891" xmlns:ns4="230e9df3-be65-4c73-a93b-d1236ebd677e" targetNamespace="http://schemas.microsoft.com/office/2006/metadata/properties" ma:root="true" ma:fieldsID="e6e4c555b5e194d05b7203de9c4567b3" ns1:_="" ns2:_="" ns3:_="" ns4:_="">
     <xsd:import namespace="http://schemas.microsoft.com/sharepoint/v3"/>
@@ -42425,15 +43665,6 @@
 </ct:contentTypeSchema>
 </file>
 
-<file path=customXml/item2.xml><?xml version="1.0" encoding="utf-8"?>
-<?mso-contentType ?>
-<FormTemplates xmlns="http://schemas.microsoft.com/sharepoint/v3/contenttype/forms">
-  <Display>DocumentLibraryForm</Display>
-  <Edit>DocumentLibraryForm</Edit>
-  <New>DocumentLibraryForm</New>
-</FormTemplates>
-</file>
-
 <file path=customXml/item3.xml><?xml version="1.0" encoding="utf-8"?>
 <p:properties xmlns:p="http://schemas.microsoft.com/office/2006/metadata/properties" xmlns:xsi="http://www.w3.org/2001/XMLSchema-instance" xmlns:pc="http://schemas.microsoft.com/office/infopath/2007/PartnerControls">
   <documentManagement>
@@ -42454,6 +43685,14 @@
 </file>
 
 <file path=customXml/itemProps1.xml><?xml version="1.0" encoding="utf-8"?>
+<ds:datastoreItem xmlns:ds="http://schemas.openxmlformats.org/officeDocument/2006/customXml" ds:itemID="{96D3147F-17C1-4C4C-A1F9-80FC58070169}">
+  <ds:schemaRefs>
+    <ds:schemaRef ds:uri="http://schemas.microsoft.com/sharepoint/v3/contenttype/forms"/>
+  </ds:schemaRefs>
+</ds:datastoreItem>
+</file>
+
+<file path=customXml/itemProps2.xml><?xml version="1.0" encoding="utf-8"?>
 <ds:datastoreItem xmlns:ds="http://schemas.openxmlformats.org/officeDocument/2006/customXml" ds:itemID="{B58C8D88-C1B9-4BB3-8CF4-AA0F02CC0C76}">
   <ds:schemaRefs>
     <ds:schemaRef ds:uri="http://schemas.microsoft.com/office/2006/metadata/contentType"/>
@@ -42470,14 +43709,6 @@
     <ds:schemaRef ds:uri="http://purl.org/dc/elements/1.1/"/>
     <ds:schemaRef ds:uri="http://purl.org/dc/terms/"/>
     <ds:schemaRef ds:uri="http://schemas.microsoft.com/internal/obd"/>
-  </ds:schemaRefs>
-</ds:datastoreItem>
-</file>
-
-<file path=customXml/itemProps2.xml><?xml version="1.0" encoding="utf-8"?>
-<ds:datastoreItem xmlns:ds="http://schemas.openxmlformats.org/officeDocument/2006/customXml" ds:itemID="{96D3147F-17C1-4C4C-A1F9-80FC58070169}">
-  <ds:schemaRefs>
-    <ds:schemaRef ds:uri="http://schemas.microsoft.com/sharepoint/v3/contenttype/forms"/>
   </ds:schemaRefs>
 </ds:datastoreItem>
 </file>

</xml_diff>